<commit_message>
update partial presentation slide
</commit_message>
<xml_diff>
--- a/Project/DDoS attack detection using Machine Learning.pptx
+++ b/Project/DDoS attack detection using Machine Learning.pptx
@@ -14,23 +14,24 @@
     <p:sldId id="259" r:id="rId9"/>
     <p:sldId id="260" r:id="rId10"/>
     <p:sldId id="261" r:id="rId11"/>
+    <p:sldId id="262" r:id="rId12"/>
   </p:sldIdLst>
   <p:sldSz cy="5143500" cx="9144000"/>
   <p:notesSz cx="6858000" cy="9144000"/>
   <p:embeddedFontLst>
     <p:embeddedFont>
       <p:font typeface="Roboto"/>
-      <p:regular r:id="rId12"/>
-      <p:bold r:id="rId13"/>
-      <p:italic r:id="rId14"/>
-      <p:boldItalic r:id="rId15"/>
+      <p:regular r:id="rId13"/>
+      <p:bold r:id="rId14"/>
+      <p:italic r:id="rId15"/>
+      <p:boldItalic r:id="rId16"/>
     </p:embeddedFont>
     <p:embeddedFont>
       <p:font typeface="Nunito"/>
-      <p:regular r:id="rId16"/>
-      <p:bold r:id="rId17"/>
-      <p:italic r:id="rId18"/>
-      <p:boldItalic r:id="rId19"/>
+      <p:regular r:id="rId17"/>
+      <p:bold r:id="rId18"/>
+      <p:italic r:id="rId19"/>
+      <p:boldItalic r:id="rId20"/>
     </p:embeddedFont>
   </p:embeddedFontLst>
   <p:defaultTextStyle>
@@ -924,7 +925,7 @@
       </p:grpSpPr>
       <p:sp>
         <p:nvSpPr>
-          <p:cNvPr id="140" name="Google Shape;140;g29ed05d1318_1_0:notes"/>
+          <p:cNvPr id="140" name="Google Shape;140;g28f4941069f_0_17:notes"/>
           <p:cNvSpPr/>
           <p:nvPr>
             <p:ph idx="2" type="sldImg"/>
@@ -959,7 +960,7 @@
       </p:sp>
       <p:sp>
         <p:nvSpPr>
-          <p:cNvPr id="141" name="Google Shape;141;g29ed05d1318_1_0:notes"/>
+          <p:cNvPr id="141" name="Google Shape;141;g28f4941069f_0_17:notes"/>
           <p:cNvSpPr txBox="1"/>
           <p:nvPr>
             <p:ph idx="1" type="body"/>
@@ -1023,7 +1024,7 @@
       </p:grpSpPr>
       <p:sp>
         <p:nvSpPr>
-          <p:cNvPr id="147" name="Google Shape;147;g28f4941069f_0_9:notes"/>
+          <p:cNvPr id="147" name="Google Shape;147;g29ed05d1318_1_0:notes"/>
           <p:cNvSpPr/>
           <p:nvPr>
             <p:ph idx="2" type="sldImg"/>
@@ -1058,7 +1059,7 @@
       </p:sp>
       <p:sp>
         <p:nvSpPr>
-          <p:cNvPr id="148" name="Google Shape;148;g28f4941069f_0_9:notes"/>
+          <p:cNvPr id="148" name="Google Shape;148;g29ed05d1318_1_0:notes"/>
           <p:cNvSpPr txBox="1"/>
           <p:nvPr>
             <p:ph idx="1" type="body"/>
@@ -1122,7 +1123,7 @@
       </p:grpSpPr>
       <p:sp>
         <p:nvSpPr>
-          <p:cNvPr id="154" name="Google Shape;154;g26f1edecfbd_0_0:notes"/>
+          <p:cNvPr id="154" name="Google Shape;154;g28f4941069f_0_27:notes"/>
           <p:cNvSpPr/>
           <p:nvPr>
             <p:ph idx="2" type="sldImg"/>
@@ -1157,7 +1158,7 @@
       </p:sp>
       <p:sp>
         <p:nvSpPr>
-          <p:cNvPr id="155" name="Google Shape;155;g26f1edecfbd_0_0:notes"/>
+          <p:cNvPr id="155" name="Google Shape;155;g28f4941069f_0_27:notes"/>
           <p:cNvSpPr txBox="1"/>
           <p:nvPr>
             <p:ph idx="1" type="body"/>
@@ -1221,7 +1222,7 @@
       </p:grpSpPr>
       <p:sp>
         <p:nvSpPr>
-          <p:cNvPr id="161" name="Google Shape;161;g240c6d9caf1_0_147:notes"/>
+          <p:cNvPr id="161" name="Google Shape;161;g28f4941069f_0_9:notes"/>
           <p:cNvSpPr/>
           <p:nvPr>
             <p:ph idx="2" type="sldImg"/>
@@ -1256,7 +1257,106 @@
       </p:sp>
       <p:sp>
         <p:nvSpPr>
-          <p:cNvPr id="162" name="Google Shape;162;g240c6d9caf1_0_147:notes"/>
+          <p:cNvPr id="162" name="Google Shape;162;g28f4941069f_0_9:notes"/>
+          <p:cNvSpPr txBox="1"/>
+          <p:nvPr>
+            <p:ph idx="1" type="body"/>
+          </p:nvPr>
+        </p:nvSpPr>
+        <p:spPr>
+          <a:xfrm>
+            <a:off x="685800" y="4343400"/>
+            <a:ext cx="5486400" cy="4114800"/>
+          </a:xfrm>
+          <a:prstGeom prst="rect">
+            <a:avLst/>
+          </a:prstGeom>
+        </p:spPr>
+        <p:txBody>
+          <a:bodyPr anchorCtr="0" anchor="t" bIns="91425" lIns="91425" spcFirstLastPara="1" rIns="91425" wrap="square" tIns="91425">
+            <a:noAutofit/>
+          </a:bodyPr>
+          <a:lstStyle/>
+          <a:p>
+            <a:pPr indent="0" lvl="0" marL="0" rtl="0" algn="l">
+              <a:spcBef>
+                <a:spcPts val="0"/>
+              </a:spcBef>
+              <a:spcAft>
+                <a:spcPts val="0"/>
+              </a:spcAft>
+              <a:buNone/>
+            </a:pPr>
+            <a:r>
+              <a:t/>
+            </a:r>
+            <a:endParaRPr/>
+          </a:p>
+        </p:txBody>
+      </p:sp>
+    </p:spTree>
+  </p:cSld>
+  <p:clrMapOvr>
+    <a:masterClrMapping/>
+  </p:clrMapOvr>
+</p:notes>
+</file>
+
+<file path=ppt/notesSlides/notesSlide7.xml><?xml version="1.0" encoding="utf-8"?>
+<p:notes xmlns:a="http://schemas.openxmlformats.org/drawingml/2006/main" xmlns:r="http://schemas.openxmlformats.org/officeDocument/2006/relationships" xmlns:mc="http://schemas.openxmlformats.org/markup-compatibility/2006" xmlns:mv="urn:schemas-microsoft-com:mac:vml" xmlns:p="http://schemas.openxmlformats.org/presentationml/2006/main" xmlns:c="http://schemas.openxmlformats.org/drawingml/2006/chart" xmlns:dgm="http://schemas.openxmlformats.org/drawingml/2006/diagram" xmlns:o="urn:schemas-microsoft-com:office:office" xmlns:v="urn:schemas-microsoft-com:vml" xmlns:pvml="urn:schemas-microsoft-com:office:powerpoint" xmlns:com="http://schemas.openxmlformats.org/drawingml/2006/compatibility" xmlns:p14="http://schemas.microsoft.com/office/powerpoint/2010/main" xmlns:p15="http://schemas.microsoft.com/office/powerpoint/2012/main" xmlns:ahyp="http://schemas.microsoft.com/office/drawing/2018/hyperlinkcolor" showMasterPhAnim="0" showMasterSp="0">
+  <p:cSld>
+    <p:spTree>
+      <p:nvGrpSpPr>
+        <p:cNvPr id="167" name="Shape 167"/>
+        <p:cNvGrpSpPr/>
+        <p:nvPr/>
+      </p:nvGrpSpPr>
+      <p:grpSpPr>
+        <a:xfrm>
+          <a:off x="0" y="0"/>
+          <a:ext cx="0" cy="0"/>
+          <a:chOff x="0" y="0"/>
+          <a:chExt cx="0" cy="0"/>
+        </a:xfrm>
+      </p:grpSpPr>
+      <p:sp>
+        <p:nvSpPr>
+          <p:cNvPr id="168" name="Google Shape;168;g240c6d9caf1_0_147:notes"/>
+          <p:cNvSpPr/>
+          <p:nvPr>
+            <p:ph idx="2" type="sldImg"/>
+          </p:nvPr>
+        </p:nvSpPr>
+        <p:spPr>
+          <a:xfrm>
+            <a:off x="381300" y="685800"/>
+            <a:ext cx="6096000" cy="3429000"/>
+          </a:xfrm>
+          <a:custGeom>
+            <a:rect b="b" l="l" r="r" t="t"/>
+            <a:pathLst>
+              <a:path extrusionOk="0" h="120000" w="120000">
+                <a:moveTo>
+                  <a:pt x="0" y="0"/>
+                </a:moveTo>
+                <a:lnTo>
+                  <a:pt x="120000" y="0"/>
+                </a:lnTo>
+                <a:lnTo>
+                  <a:pt x="120000" y="120000"/>
+                </a:lnTo>
+                <a:lnTo>
+                  <a:pt x="0" y="120000"/>
+                </a:lnTo>
+                <a:close/>
+              </a:path>
+            </a:pathLst>
+          </a:custGeom>
+        </p:spPr>
+      </p:sp>
+      <p:sp>
+        <p:nvSpPr>
+          <p:cNvPr id="169" name="Google Shape;169;g240c6d9caf1_0_147:notes"/>
           <p:cNvSpPr txBox="1"/>
           <p:nvPr>
             <p:ph idx="1" type="body"/>
@@ -10338,8 +10438,8 @@
         </p:nvSpPr>
         <p:spPr>
           <a:xfrm>
-            <a:off x="627075" y="343075"/>
-            <a:ext cx="2787900" cy="906600"/>
+            <a:off x="895350" y="590325"/>
+            <a:ext cx="4556700" cy="639000"/>
           </a:xfrm>
           <a:prstGeom prst="rect">
             <a:avLst/>
@@ -10347,7 +10447,7 @@
         </p:spPr>
         <p:txBody>
           <a:bodyPr anchorCtr="0" anchor="t" bIns="91425" lIns="91425" spcFirstLastPara="1" rIns="91425" wrap="square" tIns="91425">
-            <a:noAutofit/>
+            <a:normAutofit/>
           </a:bodyPr>
           <a:lstStyle/>
           <a:p>
@@ -10358,53 +10458,295 @@
               <a:spcAft>
                 <a:spcPts val="0"/>
               </a:spcAft>
-              <a:buSzPts val="990"/>
               <a:buNone/>
             </a:pPr>
             <a:r>
-              <a:rPr lang="en" sz="2900">
+              <a:rPr lang="en" sz="2000"/>
+              <a:t>Machine Learning and Algorithms</a:t>
+            </a:r>
+            <a:endParaRPr sz="2000"/>
+          </a:p>
+        </p:txBody>
+      </p:sp>
+      <p:sp>
+        <p:nvSpPr>
+          <p:cNvPr id="151" name="Google Shape;151;p16"/>
+          <p:cNvSpPr txBox="1"/>
+          <p:nvPr>
+            <p:ph idx="1" type="body"/>
+          </p:nvPr>
+        </p:nvSpPr>
+        <p:spPr>
+          <a:xfrm>
+            <a:off x="819150" y="1497500"/>
+            <a:ext cx="7505700" cy="3136800"/>
+          </a:xfrm>
+          <a:prstGeom prst="rect">
+            <a:avLst/>
+          </a:prstGeom>
+        </p:spPr>
+        <p:txBody>
+          <a:bodyPr anchorCtr="0" anchor="t" bIns="91425" lIns="91425" spcFirstLastPara="1" rIns="91425" wrap="square" tIns="91425">
+            <a:normAutofit fontScale="85000" lnSpcReduction="20000"/>
+          </a:bodyPr>
+          <a:lstStyle/>
+          <a:p>
+            <a:pPr indent="-314960" lvl="0" marL="457200" rtl="0" algn="l">
+              <a:lnSpc>
+                <a:spcPct val="150000"/>
+              </a:lnSpc>
+              <a:spcBef>
+                <a:spcPts val="0"/>
+              </a:spcBef>
+              <a:spcAft>
+                <a:spcPts val="0"/>
+              </a:spcAft>
+              <a:buSzPct val="100000"/>
+              <a:buFont typeface="Roboto"/>
+              <a:buChar char="●"/>
+            </a:pPr>
+            <a:r>
+              <a:rPr lang="en" sz="1600">
+                <a:latin typeface="Roboto"/>
+                <a:ea typeface="Roboto"/>
+                <a:cs typeface="Roboto"/>
+                <a:sym typeface="Roboto"/>
+              </a:rPr>
+              <a:t>Machine learning algorithms is used by identifying patterns in data, making them suitable for DDoS attack classification by analyzing network traffic features, the model can learn to distinguish between normal activity and attack signatures.</a:t>
+            </a:r>
+            <a:endParaRPr sz="1600">
+              <a:latin typeface="Roboto"/>
+              <a:ea typeface="Roboto"/>
+              <a:cs typeface="Roboto"/>
+              <a:sym typeface="Roboto"/>
+            </a:endParaRPr>
+          </a:p>
+          <a:p>
+            <a:pPr indent="-314960" lvl="0" marL="457200" rtl="0" algn="l">
+              <a:lnSpc>
+                <a:spcPct val="150000"/>
+              </a:lnSpc>
+              <a:spcBef>
+                <a:spcPts val="0"/>
+              </a:spcBef>
+              <a:spcAft>
+                <a:spcPts val="0"/>
+              </a:spcAft>
+              <a:buSzPct val="96969"/>
+              <a:buFont typeface="Roboto"/>
+              <a:buChar char="●"/>
+            </a:pPr>
+            <a:r>
+              <a:rPr lang="en" sz="1650">
                 <a:solidFill>
-                  <a:srgbClr val="000000"/>
+                  <a:srgbClr val="2D2D2D"/>
                 </a:solidFill>
+                <a:highlight>
+                  <a:srgbClr val="FFFFFF"/>
+                </a:highlight>
+                <a:latin typeface="Arial"/>
+                <a:ea typeface="Arial"/>
+                <a:cs typeface="Arial"/>
+                <a:sym typeface="Arial"/>
               </a:rPr>
-              <a:t>Project Pipeline</a:t>
+              <a:t>Random Forest</a:t>
             </a:r>
-            <a:endParaRPr sz="2500">
+            <a:endParaRPr sz="1650">
               <a:solidFill>
-                <a:srgbClr val="000000"/>
+                <a:srgbClr val="2D2D2D"/>
               </a:solidFill>
+              <a:highlight>
+                <a:srgbClr val="FFFFFF"/>
+              </a:highlight>
+              <a:latin typeface="Arial"/>
+              <a:ea typeface="Arial"/>
+              <a:cs typeface="Arial"/>
+              <a:sym typeface="Arial"/>
+            </a:endParaRPr>
+          </a:p>
+          <a:p>
+            <a:pPr indent="-314960" lvl="0" marL="457200" rtl="0" algn="l">
+              <a:lnSpc>
+                <a:spcPct val="150000"/>
+              </a:lnSpc>
+              <a:spcBef>
+                <a:spcPts val="0"/>
+              </a:spcBef>
+              <a:spcAft>
+                <a:spcPts val="0"/>
+              </a:spcAft>
+              <a:buSzPct val="96969"/>
+              <a:buFont typeface="Roboto"/>
+              <a:buChar char="●"/>
+            </a:pPr>
+            <a:r>
+              <a:rPr lang="en" sz="1650">
+                <a:solidFill>
+                  <a:srgbClr val="2D2D2D"/>
+                </a:solidFill>
+                <a:highlight>
+                  <a:srgbClr val="FFFFFF"/>
+                </a:highlight>
+                <a:latin typeface="Arial"/>
+                <a:ea typeface="Arial"/>
+                <a:cs typeface="Arial"/>
+                <a:sym typeface="Arial"/>
+              </a:rPr>
+              <a:t>Logistic Regression</a:t>
+            </a:r>
+            <a:endParaRPr sz="1650">
+              <a:solidFill>
+                <a:srgbClr val="2D2D2D"/>
+              </a:solidFill>
+              <a:highlight>
+                <a:srgbClr val="FFFFFF"/>
+              </a:highlight>
+              <a:latin typeface="Arial"/>
+              <a:ea typeface="Arial"/>
+              <a:cs typeface="Arial"/>
+              <a:sym typeface="Arial"/>
+            </a:endParaRPr>
+          </a:p>
+          <a:p>
+            <a:pPr indent="-314960" lvl="0" marL="457200" rtl="0" algn="l">
+              <a:lnSpc>
+                <a:spcPct val="150000"/>
+              </a:lnSpc>
+              <a:spcBef>
+                <a:spcPts val="0"/>
+              </a:spcBef>
+              <a:spcAft>
+                <a:spcPts val="0"/>
+              </a:spcAft>
+              <a:buSzPct val="96969"/>
+              <a:buFont typeface="Roboto"/>
+              <a:buChar char="●"/>
+            </a:pPr>
+            <a:r>
+              <a:rPr lang="en" sz="1650">
+                <a:solidFill>
+                  <a:srgbClr val="2D2D2D"/>
+                </a:solidFill>
+                <a:highlight>
+                  <a:srgbClr val="FFFFFF"/>
+                </a:highlight>
+                <a:latin typeface="Arial"/>
+                <a:ea typeface="Arial"/>
+                <a:cs typeface="Arial"/>
+                <a:sym typeface="Arial"/>
+              </a:rPr>
+              <a:t>Neural Networks</a:t>
+            </a:r>
+            <a:endParaRPr sz="1650">
+              <a:solidFill>
+                <a:srgbClr val="2D2D2D"/>
+              </a:solidFill>
+              <a:highlight>
+                <a:srgbClr val="FFFFFF"/>
+              </a:highlight>
+              <a:latin typeface="Arial"/>
+              <a:ea typeface="Arial"/>
+              <a:cs typeface="Arial"/>
+              <a:sym typeface="Arial"/>
+            </a:endParaRPr>
+          </a:p>
+          <a:p>
+            <a:pPr indent="-317658" lvl="0" marL="457200" rtl="0" algn="l">
+              <a:lnSpc>
+                <a:spcPct val="150000"/>
+              </a:lnSpc>
+              <a:spcBef>
+                <a:spcPts val="0"/>
+              </a:spcBef>
+              <a:spcAft>
+                <a:spcPts val="0"/>
+              </a:spcAft>
+              <a:buClr>
+                <a:srgbClr val="2D2D2D"/>
+              </a:buClr>
+              <a:buSzPct val="100000"/>
+              <a:buFont typeface="Arial"/>
+              <a:buChar char="●"/>
+            </a:pPr>
+            <a:r>
+              <a:rPr lang="en" sz="1650">
+                <a:solidFill>
+                  <a:srgbClr val="2D2D2D"/>
+                </a:solidFill>
+                <a:highlight>
+                  <a:srgbClr val="FFFFFF"/>
+                </a:highlight>
+                <a:latin typeface="Arial"/>
+                <a:ea typeface="Arial"/>
+                <a:cs typeface="Arial"/>
+                <a:sym typeface="Arial"/>
+              </a:rPr>
+              <a:t>Then we will compare all the models that were trained under the algorithms to find out which model had the best accuracy in determining the DDoS attacks flows.  </a:t>
+            </a:r>
+            <a:endParaRPr sz="1650">
+              <a:solidFill>
+                <a:srgbClr val="2D2D2D"/>
+              </a:solidFill>
+              <a:highlight>
+                <a:srgbClr val="FFFFFF"/>
+              </a:highlight>
+              <a:latin typeface="Arial"/>
+              <a:ea typeface="Arial"/>
+              <a:cs typeface="Arial"/>
+              <a:sym typeface="Arial"/>
+            </a:endParaRPr>
+          </a:p>
+          <a:p>
+            <a:pPr indent="0" lvl="0" marL="457200" rtl="0" algn="l">
+              <a:lnSpc>
+                <a:spcPct val="150000"/>
+              </a:lnSpc>
+              <a:spcBef>
+                <a:spcPts val="1200"/>
+              </a:spcBef>
+              <a:spcAft>
+                <a:spcPts val="0"/>
+              </a:spcAft>
+              <a:buNone/>
+            </a:pPr>
+            <a:r>
+              <a:t/>
+            </a:r>
+            <a:endParaRPr sz="1350">
+              <a:solidFill>
+                <a:srgbClr val="2D2D2D"/>
+              </a:solidFill>
+              <a:highlight>
+                <a:srgbClr val="FFFFFF"/>
+              </a:highlight>
+              <a:latin typeface="Arial"/>
+              <a:ea typeface="Arial"/>
+              <a:cs typeface="Arial"/>
+              <a:sym typeface="Arial"/>
+            </a:endParaRPr>
+          </a:p>
+          <a:p>
+            <a:pPr indent="0" lvl="0" marL="457200" rtl="0" algn="l">
+              <a:spcBef>
+                <a:spcPts val="1200"/>
+              </a:spcBef>
+              <a:spcAft>
+                <a:spcPts val="1200"/>
+              </a:spcAft>
+              <a:buNone/>
+            </a:pPr>
+            <a:r>
+              <a:t/>
+            </a:r>
+            <a:endParaRPr sz="1500">
+              <a:latin typeface="Arial"/>
+              <a:ea typeface="Arial"/>
+              <a:cs typeface="Arial"/>
+              <a:sym typeface="Arial"/>
             </a:endParaRPr>
           </a:p>
         </p:txBody>
       </p:sp>
-      <p:pic>
-        <p:nvPicPr>
-          <p:cNvPr id="151" name="Google Shape;151;p16"/>
-          <p:cNvPicPr preferRelativeResize="0"/>
-          <p:nvPr/>
-        </p:nvPicPr>
-        <p:blipFill>
-          <a:blip r:embed="rId3">
-            <a:alphaModFix/>
-          </a:blip>
-          <a:stretch>
-            <a:fillRect/>
-          </a:stretch>
-        </p:blipFill>
-        <p:spPr>
-          <a:xfrm>
-            <a:off x="204700" y="990950"/>
-            <a:ext cx="8734598" cy="3946326"/>
-          </a:xfrm>
-          <a:prstGeom prst="rect">
-            <a:avLst/>
-          </a:prstGeom>
-          <a:noFill/>
-          <a:ln>
-            <a:noFill/>
-          </a:ln>
-        </p:spPr>
-      </p:pic>
       <p:sp>
         <p:nvSpPr>
           <p:cNvPr id="152" name="Google Shape;152;p16"/>
@@ -10480,8 +10822,8 @@
         </p:nvSpPr>
         <p:spPr>
           <a:xfrm>
-            <a:off x="844900" y="478650"/>
-            <a:ext cx="7505700" cy="639000"/>
+            <a:off x="895350" y="590325"/>
+            <a:ext cx="4556700" cy="639000"/>
           </a:xfrm>
           <a:prstGeom prst="rect">
             <a:avLst/>
@@ -10504,7 +10846,7 @@
             </a:pPr>
             <a:r>
               <a:rPr lang="en" sz="2000"/>
-              <a:t>Training our model</a:t>
+              <a:t>Machine Learning and Algorithms</a:t>
             </a:r>
             <a:endParaRPr sz="2000"/>
           </a:p>
@@ -10520,8 +10862,8 @@
         </p:nvSpPr>
         <p:spPr>
           <a:xfrm>
-            <a:off x="819150" y="1040300"/>
-            <a:ext cx="7505700" cy="3207900"/>
+            <a:off x="819150" y="1497500"/>
+            <a:ext cx="7505700" cy="3136800"/>
           </a:xfrm>
           <a:prstGeom prst="rect">
             <a:avLst/>
@@ -10529,31 +10871,34 @@
         </p:spPr>
         <p:txBody>
           <a:bodyPr anchorCtr="0" anchor="t" bIns="91425" lIns="91425" spcFirstLastPara="1" rIns="91425" wrap="square" tIns="91425">
-            <a:normAutofit/>
+            <a:normAutofit fontScale="85000" lnSpcReduction="20000"/>
           </a:bodyPr>
           <a:lstStyle/>
           <a:p>
-            <a:pPr indent="-304800" lvl="0" marL="457200" rtl="0" algn="l">
-              <a:spcBef>
-                <a:spcPts val="0"/>
-              </a:spcBef>
-              <a:spcAft>
-                <a:spcPts val="0"/>
-              </a:spcAft>
-              <a:buSzPts val="1200"/>
+            <a:pPr indent="-314960" lvl="0" marL="457200" rtl="0" algn="l">
+              <a:lnSpc>
+                <a:spcPct val="150000"/>
+              </a:lnSpc>
+              <a:spcBef>
+                <a:spcPts val="0"/>
+              </a:spcBef>
+              <a:spcAft>
+                <a:spcPts val="0"/>
+              </a:spcAft>
+              <a:buSzPct val="100000"/>
               <a:buFont typeface="Roboto"/>
               <a:buChar char="●"/>
             </a:pPr>
             <a:r>
-              <a:rPr lang="en" sz="1200">
+              <a:rPr lang="en" sz="1600">
                 <a:latin typeface="Roboto"/>
                 <a:ea typeface="Roboto"/>
                 <a:cs typeface="Roboto"/>
                 <a:sym typeface="Roboto"/>
               </a:rPr>
-              <a:t>We will train our model by implementing Random Forest, Logistic Regression and if possible neural network algorithms</a:t>
+              <a:t>Machine learning algorithms is used by identifying patterns in data, making them suitable for DDoS attack classification by analyzing network traffic features, the model can learn to distinguish between normal activity and attack signatures.</a:t>
             </a:r>
-            <a:endParaRPr sz="1200">
+            <a:endParaRPr sz="1600">
               <a:latin typeface="Roboto"/>
               <a:ea typeface="Roboto"/>
               <a:cs typeface="Roboto"/>
@@ -10561,31 +10906,207 @@
             </a:endParaRPr>
           </a:p>
           <a:p>
-            <a:pPr indent="-304800" lvl="0" marL="457200" rtl="0" algn="l">
-              <a:spcBef>
-                <a:spcPts val="0"/>
-              </a:spcBef>
-              <a:spcAft>
-                <a:spcPts val="0"/>
-              </a:spcAft>
-              <a:buSzPts val="1200"/>
+            <a:pPr indent="-314960" lvl="0" marL="457200" rtl="0" algn="l">
+              <a:lnSpc>
+                <a:spcPct val="150000"/>
+              </a:lnSpc>
+              <a:spcBef>
+                <a:spcPts val="0"/>
+              </a:spcBef>
+              <a:spcAft>
+                <a:spcPts val="0"/>
+              </a:spcAft>
+              <a:buSzPct val="96969"/>
               <a:buFont typeface="Roboto"/>
               <a:buChar char="●"/>
             </a:pPr>
             <a:r>
-              <a:rPr lang="en" sz="1200">
-                <a:latin typeface="Roboto"/>
-                <a:ea typeface="Roboto"/>
-                <a:cs typeface="Roboto"/>
-                <a:sym typeface="Roboto"/>
+              <a:rPr lang="en" sz="1650">
+                <a:solidFill>
+                  <a:srgbClr val="2D2D2D"/>
+                </a:solidFill>
+                <a:highlight>
+                  <a:srgbClr val="FFFFFF"/>
+                </a:highlight>
+                <a:latin typeface="Arial"/>
+                <a:ea typeface="Arial"/>
+                <a:cs typeface="Arial"/>
+                <a:sym typeface="Arial"/>
+              </a:rPr>
+              <a:t>Random Forest</a:t>
+            </a:r>
+            <a:endParaRPr sz="1650">
+              <a:solidFill>
+                <a:srgbClr val="2D2D2D"/>
+              </a:solidFill>
+              <a:highlight>
+                <a:srgbClr val="FFFFFF"/>
+              </a:highlight>
+              <a:latin typeface="Arial"/>
+              <a:ea typeface="Arial"/>
+              <a:cs typeface="Arial"/>
+              <a:sym typeface="Arial"/>
+            </a:endParaRPr>
+          </a:p>
+          <a:p>
+            <a:pPr indent="-314960" lvl="0" marL="457200" rtl="0" algn="l">
+              <a:lnSpc>
+                <a:spcPct val="150000"/>
+              </a:lnSpc>
+              <a:spcBef>
+                <a:spcPts val="0"/>
+              </a:spcBef>
+              <a:spcAft>
+                <a:spcPts val="0"/>
+              </a:spcAft>
+              <a:buSzPct val="96969"/>
+              <a:buFont typeface="Roboto"/>
+              <a:buChar char="●"/>
+            </a:pPr>
+            <a:r>
+              <a:rPr lang="en" sz="1650">
+                <a:solidFill>
+                  <a:srgbClr val="2D2D2D"/>
+                </a:solidFill>
+                <a:highlight>
+                  <a:srgbClr val="FFFFFF"/>
+                </a:highlight>
+                <a:latin typeface="Arial"/>
+                <a:ea typeface="Arial"/>
+                <a:cs typeface="Arial"/>
+                <a:sym typeface="Arial"/>
+              </a:rPr>
+              <a:t>Logistic Regression</a:t>
+            </a:r>
+            <a:endParaRPr sz="1650">
+              <a:solidFill>
+                <a:srgbClr val="2D2D2D"/>
+              </a:solidFill>
+              <a:highlight>
+                <a:srgbClr val="FFFFFF"/>
+              </a:highlight>
+              <a:latin typeface="Arial"/>
+              <a:ea typeface="Arial"/>
+              <a:cs typeface="Arial"/>
+              <a:sym typeface="Arial"/>
+            </a:endParaRPr>
+          </a:p>
+          <a:p>
+            <a:pPr indent="-314960" lvl="0" marL="457200" rtl="0" algn="l">
+              <a:lnSpc>
+                <a:spcPct val="150000"/>
+              </a:lnSpc>
+              <a:spcBef>
+                <a:spcPts val="0"/>
+              </a:spcBef>
+              <a:spcAft>
+                <a:spcPts val="0"/>
+              </a:spcAft>
+              <a:buSzPct val="96969"/>
+              <a:buFont typeface="Roboto"/>
+              <a:buChar char="●"/>
+            </a:pPr>
+            <a:r>
+              <a:rPr lang="en" sz="1650">
+                <a:solidFill>
+                  <a:srgbClr val="2D2D2D"/>
+                </a:solidFill>
+                <a:highlight>
+                  <a:srgbClr val="FFFFFF"/>
+                </a:highlight>
+                <a:latin typeface="Arial"/>
+                <a:ea typeface="Arial"/>
+                <a:cs typeface="Arial"/>
+                <a:sym typeface="Arial"/>
+              </a:rPr>
+              <a:t>Neural Networks</a:t>
+            </a:r>
+            <a:endParaRPr sz="1650">
+              <a:solidFill>
+                <a:srgbClr val="2D2D2D"/>
+              </a:solidFill>
+              <a:highlight>
+                <a:srgbClr val="FFFFFF"/>
+              </a:highlight>
+              <a:latin typeface="Arial"/>
+              <a:ea typeface="Arial"/>
+              <a:cs typeface="Arial"/>
+              <a:sym typeface="Arial"/>
+            </a:endParaRPr>
+          </a:p>
+          <a:p>
+            <a:pPr indent="-317658" lvl="0" marL="457200" rtl="0" algn="l">
+              <a:lnSpc>
+                <a:spcPct val="150000"/>
+              </a:lnSpc>
+              <a:spcBef>
+                <a:spcPts val="0"/>
+              </a:spcBef>
+              <a:spcAft>
+                <a:spcPts val="0"/>
+              </a:spcAft>
+              <a:buClr>
+                <a:srgbClr val="2D2D2D"/>
+              </a:buClr>
+              <a:buSzPct val="100000"/>
+              <a:buFont typeface="Arial"/>
+              <a:buChar char="●"/>
+            </a:pPr>
+            <a:r>
+              <a:rPr lang="en" sz="1650">
+                <a:solidFill>
+                  <a:srgbClr val="2D2D2D"/>
+                </a:solidFill>
+                <a:highlight>
+                  <a:srgbClr val="FFFFFF"/>
+                </a:highlight>
+                <a:latin typeface="Arial"/>
+                <a:ea typeface="Arial"/>
+                <a:cs typeface="Arial"/>
+                <a:sym typeface="Arial"/>
               </a:rPr>
               <a:t>Then we will compare all the models that were trained under the algorithms to find out which model had the best accuracy in determining the DDoS attacks flows.  </a:t>
             </a:r>
-            <a:endParaRPr sz="1200">
-              <a:latin typeface="Roboto"/>
-              <a:ea typeface="Roboto"/>
-              <a:cs typeface="Roboto"/>
-              <a:sym typeface="Roboto"/>
+            <a:endParaRPr sz="1650">
+              <a:solidFill>
+                <a:srgbClr val="2D2D2D"/>
+              </a:solidFill>
+              <a:highlight>
+                <a:srgbClr val="FFFFFF"/>
+              </a:highlight>
+              <a:latin typeface="Arial"/>
+              <a:ea typeface="Arial"/>
+              <a:cs typeface="Arial"/>
+              <a:sym typeface="Arial"/>
+            </a:endParaRPr>
+          </a:p>
+          <a:p>
+            <a:pPr indent="0" lvl="0" marL="457200" rtl="0" algn="l">
+              <a:lnSpc>
+                <a:spcPct val="150000"/>
+              </a:lnSpc>
+              <a:spcBef>
+                <a:spcPts val="1200"/>
+              </a:spcBef>
+              <a:spcAft>
+                <a:spcPts val="0"/>
+              </a:spcAft>
+              <a:buNone/>
+            </a:pPr>
+            <a:r>
+              <a:t/>
+            </a:r>
+            <a:endParaRPr sz="1350">
+              <a:solidFill>
+                <a:srgbClr val="2D2D2D"/>
+              </a:solidFill>
+              <a:highlight>
+                <a:srgbClr val="FFFFFF"/>
+              </a:highlight>
+              <a:latin typeface="Arial"/>
+              <a:ea typeface="Arial"/>
+              <a:cs typeface="Arial"/>
+              <a:sym typeface="Arial"/>
             </a:endParaRPr>
           </a:p>
           <a:p>
@@ -10685,6 +11206,148 @@
         </p:nvSpPr>
         <p:spPr>
           <a:xfrm>
+            <a:off x="627075" y="343075"/>
+            <a:ext cx="2787900" cy="906600"/>
+          </a:xfrm>
+          <a:prstGeom prst="rect">
+            <a:avLst/>
+          </a:prstGeom>
+        </p:spPr>
+        <p:txBody>
+          <a:bodyPr anchorCtr="0" anchor="t" bIns="91425" lIns="91425" spcFirstLastPara="1" rIns="91425" wrap="square" tIns="91425">
+            <a:noAutofit/>
+          </a:bodyPr>
+          <a:lstStyle/>
+          <a:p>
+            <a:pPr indent="0" lvl="0" marL="0" rtl="0" algn="l">
+              <a:spcBef>
+                <a:spcPts val="0"/>
+              </a:spcBef>
+              <a:spcAft>
+                <a:spcPts val="0"/>
+              </a:spcAft>
+              <a:buSzPts val="990"/>
+              <a:buNone/>
+            </a:pPr>
+            <a:r>
+              <a:rPr lang="en" sz="2900">
+                <a:solidFill>
+                  <a:srgbClr val="000000"/>
+                </a:solidFill>
+              </a:rPr>
+              <a:t>Project Pipeline</a:t>
+            </a:r>
+            <a:endParaRPr sz="2500">
+              <a:solidFill>
+                <a:srgbClr val="000000"/>
+              </a:solidFill>
+            </a:endParaRPr>
+          </a:p>
+        </p:txBody>
+      </p:sp>
+      <p:pic>
+        <p:nvPicPr>
+          <p:cNvPr id="165" name="Google Shape;165;p18"/>
+          <p:cNvPicPr preferRelativeResize="0"/>
+          <p:nvPr/>
+        </p:nvPicPr>
+        <p:blipFill>
+          <a:blip r:embed="rId3">
+            <a:alphaModFix/>
+          </a:blip>
+          <a:stretch>
+            <a:fillRect/>
+          </a:stretch>
+        </p:blipFill>
+        <p:spPr>
+          <a:xfrm>
+            <a:off x="204700" y="990950"/>
+            <a:ext cx="8734598" cy="3946326"/>
+          </a:xfrm>
+          <a:prstGeom prst="rect">
+            <a:avLst/>
+          </a:prstGeom>
+          <a:noFill/>
+          <a:ln>
+            <a:noFill/>
+          </a:ln>
+        </p:spPr>
+      </p:pic>
+      <p:sp>
+        <p:nvSpPr>
+          <p:cNvPr id="166" name="Google Shape;166;p18"/>
+          <p:cNvSpPr txBox="1"/>
+          <p:nvPr>
+            <p:ph idx="12" type="sldNum"/>
+          </p:nvPr>
+        </p:nvSpPr>
+        <p:spPr>
+          <a:xfrm>
+            <a:off x="8390734" y="4543668"/>
+            <a:ext cx="548700" cy="393600"/>
+          </a:xfrm>
+          <a:prstGeom prst="rect">
+            <a:avLst/>
+          </a:prstGeom>
+        </p:spPr>
+        <p:txBody>
+          <a:bodyPr anchorCtr="0" anchor="ctr" bIns="91425" lIns="91425" spcFirstLastPara="1" rIns="91425" wrap="square" tIns="91425">
+            <a:normAutofit/>
+          </a:bodyPr>
+          <a:lstStyle/>
+          <a:p>
+            <a:pPr indent="0" lvl="0" marL="0" rtl="0" algn="r">
+              <a:spcBef>
+                <a:spcPts val="0"/>
+              </a:spcBef>
+              <a:spcAft>
+                <a:spcPts val="0"/>
+              </a:spcAft>
+              <a:buNone/>
+            </a:pPr>
+            <a:fld id="{00000000-1234-1234-1234-123412341234}" type="slidenum">
+              <a:rPr lang="en"/>
+              <a:t>‹#›</a:t>
+            </a:fld>
+            <a:endParaRPr/>
+          </a:p>
+        </p:txBody>
+      </p:sp>
+    </p:spTree>
+  </p:cSld>
+  <p:clrMapOvr>
+    <a:masterClrMapping/>
+  </p:clrMapOvr>
+</p:sld>
+</file>
+
+<file path=ppt/slides/slide7.xml><?xml version="1.0" encoding="utf-8"?>
+<p:sld xmlns:a="http://schemas.openxmlformats.org/drawingml/2006/main" xmlns:r="http://schemas.openxmlformats.org/officeDocument/2006/relationships" xmlns:mc="http://schemas.openxmlformats.org/markup-compatibility/2006" xmlns:mv="urn:schemas-microsoft-com:mac:vml" xmlns:p="http://schemas.openxmlformats.org/presentationml/2006/main" xmlns:c="http://schemas.openxmlformats.org/drawingml/2006/chart" xmlns:dgm="http://schemas.openxmlformats.org/drawingml/2006/diagram" xmlns:o="urn:schemas-microsoft-com:office:office" xmlns:v="urn:schemas-microsoft-com:vml" xmlns:pvml="urn:schemas-microsoft-com:office:powerpoint" xmlns:com="http://schemas.openxmlformats.org/drawingml/2006/compatibility" xmlns:p14="http://schemas.microsoft.com/office/powerpoint/2010/main" xmlns:p15="http://schemas.microsoft.com/office/powerpoint/2012/main" xmlns:ahyp="http://schemas.microsoft.com/office/drawing/2018/hyperlinkcolor">
+  <p:cSld>
+    <p:spTree>
+      <p:nvGrpSpPr>
+        <p:cNvPr id="170" name="Shape 170"/>
+        <p:cNvGrpSpPr/>
+        <p:nvPr/>
+      </p:nvGrpSpPr>
+      <p:grpSpPr>
+        <a:xfrm>
+          <a:off x="0" y="0"/>
+          <a:ext cx="0" cy="0"/>
+          <a:chOff x="0" y="0"/>
+          <a:chExt cx="0" cy="0"/>
+        </a:xfrm>
+      </p:grpSpPr>
+      <p:sp>
+        <p:nvSpPr>
+          <p:cNvPr id="171" name="Google Shape;171;p19"/>
+          <p:cNvSpPr txBox="1"/>
+          <p:nvPr>
+            <p:ph type="title"/>
+          </p:nvPr>
+        </p:nvSpPr>
+        <p:spPr>
+          <a:xfrm>
             <a:off x="3166425" y="2094450"/>
             <a:ext cx="3114900" cy="954600"/>
           </a:xfrm>
@@ -10727,7 +11390,7 @@
       </p:sp>
       <p:sp>
         <p:nvSpPr>
-          <p:cNvPr id="165" name="Google Shape;165;p18"/>
+          <p:cNvPr id="172" name="Google Shape;172;p19"/>
           <p:cNvSpPr txBox="1"/>
           <p:nvPr>
             <p:ph idx="12" type="sldNum"/>

</xml_diff>